<commit_message>
update DESEQ2 bar plot
</commit_message>
<xml_diff>
--- a/Rdata/OSF_analysis/01Sept2020.pptx
+++ b/Rdata/OSF_analysis/01Sept2020.pptx
@@ -14,8 +14,9 @@
     <p:sldId id="259" r:id="rId8"/>
     <p:sldId id="264" r:id="rId9"/>
     <p:sldId id="266" r:id="rId10"/>
-    <p:sldId id="267" r:id="rId11"/>
-    <p:sldId id="265" r:id="rId12"/>
+    <p:sldId id="268" r:id="rId11"/>
+    <p:sldId id="267" r:id="rId12"/>
+    <p:sldId id="265" r:id="rId13"/>
   </p:sldIdLst>
   <p:sldSz cx="12192000" cy="6858000"/>
   <p:notesSz cx="6858000" cy="9144000"/>
@@ -114,6 +115,11 @@
       </a:defRPr>
     </a:lvl9pPr>
   </p:defaultTextStyle>
+  <p:extLst>
+    <p:ext uri="{EFAFB233-063F-42B5-8137-9DF3F51BA10A}">
+      <p15:sldGuideLst xmlns:p15="http://schemas.microsoft.com/office/powerpoint/2012/main"/>
+    </p:ext>
+  </p:extLst>
 </p:presentation>
 </file>
 
@@ -3419,6 +3425,142 @@
           <a:chExt cx="0" cy="0"/>
         </a:xfrm>
       </p:grpSpPr>
+      <p:sp>
+        <p:nvSpPr>
+          <p:cNvPr id="7" name="TextBox 6">
+            <a:extLst>
+              <a:ext uri="{FF2B5EF4-FFF2-40B4-BE49-F238E27FC236}">
+                <a16:creationId xmlns:a16="http://schemas.microsoft.com/office/drawing/2014/main" id="{44CFDF76-9AFE-4E5A-AC6F-D166BABC3F69}"/>
+              </a:ext>
+            </a:extLst>
+          </p:cNvPr>
+          <p:cNvSpPr txBox="1"/>
+          <p:nvPr/>
+        </p:nvSpPr>
+        <p:spPr>
+          <a:xfrm>
+            <a:off x="9327502" y="0"/>
+            <a:ext cx="2864498" cy="1200329"/>
+          </a:xfrm>
+          <a:prstGeom prst="rect">
+            <a:avLst/>
+          </a:prstGeom>
+          <a:noFill/>
+        </p:spPr>
+        <p:txBody>
+          <a:bodyPr wrap="square" rtlCol="0">
+            <a:spAutoFit/>
+          </a:bodyPr>
+          <a:lstStyle/>
+          <a:p>
+            <a:pPr algn="ctr"/>
+            <a:r>
+              <a:rPr lang="en-US" sz="2400" u="sng" dirty="0"/>
+              <a:t> % Relative Abundance of DESeq2 Taxa</a:t>
+            </a:r>
+          </a:p>
+        </p:txBody>
+      </p:sp>
+      <p:pic>
+        <p:nvPicPr>
+          <p:cNvPr id="3" name="Picture 2" descr="A picture containing implement, stationary, pencil, colorful&#10;&#10;Description automatically generated">
+            <a:extLst>
+              <a:ext uri="{FF2B5EF4-FFF2-40B4-BE49-F238E27FC236}">
+                <a16:creationId xmlns:a16="http://schemas.microsoft.com/office/drawing/2014/main" id="{BE88D31A-D325-4A8D-91A1-2F9CE98A9EB5}"/>
+              </a:ext>
+            </a:extLst>
+          </p:cNvPr>
+          <p:cNvPicPr>
+            <a:picLocks noChangeAspect="1"/>
+          </p:cNvPicPr>
+          <p:nvPr/>
+        </p:nvPicPr>
+        <p:blipFill rotWithShape="1">
+          <a:blip r:embed="rId2">
+            <a:extLst>
+              <a:ext uri="{28A0092B-C50C-407E-A947-70E740481C1C}">
+                <a14:useLocalDpi xmlns:a14="http://schemas.microsoft.com/office/drawing/2010/main" val="0"/>
+              </a:ext>
+            </a:extLst>
+          </a:blip>
+          <a:srcRect r="27173" b="3946"/>
+          <a:stretch/>
+        </p:blipFill>
+        <p:spPr>
+          <a:xfrm>
+            <a:off x="-17653" y="480526"/>
+            <a:ext cx="9345155" cy="6162869"/>
+          </a:xfrm>
+          <a:prstGeom prst="rect">
+            <a:avLst/>
+          </a:prstGeom>
+        </p:spPr>
+      </p:pic>
+      <p:pic>
+        <p:nvPicPr>
+          <p:cNvPr id="5" name="Picture 4" descr="A picture containing implement, stationary, pencil, colorful&#10;&#10;Description automatically generated">
+            <a:extLst>
+              <a:ext uri="{FF2B5EF4-FFF2-40B4-BE49-F238E27FC236}">
+                <a16:creationId xmlns:a16="http://schemas.microsoft.com/office/drawing/2014/main" id="{A0BBC364-A50D-4C93-B6D5-B730345346AC}"/>
+              </a:ext>
+            </a:extLst>
+          </p:cNvPr>
+          <p:cNvPicPr>
+            <a:picLocks noChangeAspect="1"/>
+          </p:cNvPicPr>
+          <p:nvPr/>
+        </p:nvPicPr>
+        <p:blipFill rotWithShape="1">
+          <a:blip r:embed="rId2">
+            <a:extLst>
+              <a:ext uri="{28A0092B-C50C-407E-A947-70E740481C1C}">
+                <a14:useLocalDpi xmlns:a14="http://schemas.microsoft.com/office/drawing/2010/main" val="0"/>
+              </a:ext>
+            </a:extLst>
+          </a:blip>
+          <a:srcRect l="73807" t="4537" r="1135" b="21025"/>
+          <a:stretch/>
+        </p:blipFill>
+        <p:spPr>
+          <a:xfrm>
+            <a:off x="9327502" y="1680705"/>
+            <a:ext cx="2864498" cy="4254759"/>
+          </a:xfrm>
+          <a:prstGeom prst="rect">
+            <a:avLst/>
+          </a:prstGeom>
+        </p:spPr>
+      </p:pic>
+    </p:spTree>
+    <p:extLst>
+      <p:ext uri="{BB962C8B-B14F-4D97-AF65-F5344CB8AC3E}">
+        <p14:creationId xmlns:p14="http://schemas.microsoft.com/office/powerpoint/2010/main" val="3872918819"/>
+      </p:ext>
+    </p:extLst>
+  </p:cSld>
+  <p:clrMapOvr>
+    <a:masterClrMapping/>
+  </p:clrMapOvr>
+</p:sld>
+</file>
+
+<file path=ppt/slides/slide11.xml><?xml version="1.0" encoding="utf-8"?>
+<p:sld xmlns:a="http://schemas.openxmlformats.org/drawingml/2006/main" xmlns:r="http://schemas.openxmlformats.org/officeDocument/2006/relationships" xmlns:p="http://schemas.openxmlformats.org/presentationml/2006/main">
+  <p:cSld>
+    <p:spTree>
+      <p:nvGrpSpPr>
+        <p:cNvPr id="1" name=""/>
+        <p:cNvGrpSpPr/>
+        <p:nvPr/>
+      </p:nvGrpSpPr>
+      <p:grpSpPr>
+        <a:xfrm>
+          <a:off x="0" y="0"/>
+          <a:ext cx="0" cy="0"/>
+          <a:chOff x="0" y="0"/>
+          <a:chExt cx="0" cy="0"/>
+        </a:xfrm>
+      </p:grpSpPr>
       <p:pic>
         <p:nvPicPr>
           <p:cNvPr id="3" name="Picture 2" descr="A screenshot of a cell phone&#10;&#10;Description automatically generated">
@@ -3551,7 +3693,7 @@
 </p:sld>
 </file>
 
-<file path=ppt/slides/slide11.xml><?xml version="1.0" encoding="utf-8"?>
+<file path=ppt/slides/slide12.xml><?xml version="1.0" encoding="utf-8"?>
 <p:sld xmlns:a="http://schemas.openxmlformats.org/drawingml/2006/main" xmlns:r="http://schemas.openxmlformats.org/officeDocument/2006/relationships" xmlns:p="http://schemas.openxmlformats.org/presentationml/2006/main">
   <p:cSld>
     <p:spTree>

</xml_diff>